<commit_message>
Added new validation scripts to documentation.
</commit_message>
<xml_diff>
--- a/docs/models/deep_convolutional_transcriber/DCT.pptx
+++ b/docs/models/deep_convolutional_transcriber/DCT.pptx
@@ -104,6 +104,11 @@
       </a:defRPr>
     </a:lvl9pPr>
   </p:defaultTextStyle>
+  <p:extLst>
+    <p:ext uri="{EFAFB233-063F-42B5-8137-9DF3F51BA10A}">
+      <p15:sldGuideLst xmlns:p15="http://schemas.microsoft.com/office/powerpoint/2012/main"/>
+    </p:ext>
+  </p:extLst>
 </p:presentation>
 </file>
 
@@ -256,7 +261,7 @@
           <a:p>
             <a:fld id="{EF4D51DD-81A9-48E9-84B4-E5461181C836}" type="datetimeFigureOut">
               <a:rPr lang="en-GB" smtClean="0"/>
-              <a:t>06/07/2020</a:t>
+              <a:t>22/07/2020</a:t>
             </a:fld>
             <a:endParaRPr lang="en-GB"/>
           </a:p>
@@ -456,7 +461,7 @@
           <a:p>
             <a:fld id="{EF4D51DD-81A9-48E9-84B4-E5461181C836}" type="datetimeFigureOut">
               <a:rPr lang="en-GB" smtClean="0"/>
-              <a:t>06/07/2020</a:t>
+              <a:t>22/07/2020</a:t>
             </a:fld>
             <a:endParaRPr lang="en-GB"/>
           </a:p>
@@ -666,7 +671,7 @@
           <a:p>
             <a:fld id="{EF4D51DD-81A9-48E9-84B4-E5461181C836}" type="datetimeFigureOut">
               <a:rPr lang="en-GB" smtClean="0"/>
-              <a:t>06/07/2020</a:t>
+              <a:t>22/07/2020</a:t>
             </a:fld>
             <a:endParaRPr lang="en-GB"/>
           </a:p>
@@ -866,7 +871,7 @@
           <a:p>
             <a:fld id="{EF4D51DD-81A9-48E9-84B4-E5461181C836}" type="datetimeFigureOut">
               <a:rPr lang="en-GB" smtClean="0"/>
-              <a:t>06/07/2020</a:t>
+              <a:t>22/07/2020</a:t>
             </a:fld>
             <a:endParaRPr lang="en-GB"/>
           </a:p>
@@ -1142,7 +1147,7 @@
           <a:p>
             <a:fld id="{EF4D51DD-81A9-48E9-84B4-E5461181C836}" type="datetimeFigureOut">
               <a:rPr lang="en-GB" smtClean="0"/>
-              <a:t>06/07/2020</a:t>
+              <a:t>22/07/2020</a:t>
             </a:fld>
             <a:endParaRPr lang="en-GB"/>
           </a:p>
@@ -1410,7 +1415,7 @@
           <a:p>
             <a:fld id="{EF4D51DD-81A9-48E9-84B4-E5461181C836}" type="datetimeFigureOut">
               <a:rPr lang="en-GB" smtClean="0"/>
-              <a:t>06/07/2020</a:t>
+              <a:t>22/07/2020</a:t>
             </a:fld>
             <a:endParaRPr lang="en-GB"/>
           </a:p>
@@ -1825,7 +1830,7 @@
           <a:p>
             <a:fld id="{EF4D51DD-81A9-48E9-84B4-E5461181C836}" type="datetimeFigureOut">
               <a:rPr lang="en-GB" smtClean="0"/>
-              <a:t>06/07/2020</a:t>
+              <a:t>22/07/2020</a:t>
             </a:fld>
             <a:endParaRPr lang="en-GB"/>
           </a:p>
@@ -1967,7 +1972,7 @@
           <a:p>
             <a:fld id="{EF4D51DD-81A9-48E9-84B4-E5461181C836}" type="datetimeFigureOut">
               <a:rPr lang="en-GB" smtClean="0"/>
-              <a:t>06/07/2020</a:t>
+              <a:t>22/07/2020</a:t>
             </a:fld>
             <a:endParaRPr lang="en-GB"/>
           </a:p>
@@ -2080,7 +2085,7 @@
           <a:p>
             <a:fld id="{EF4D51DD-81A9-48E9-84B4-E5461181C836}" type="datetimeFigureOut">
               <a:rPr lang="en-GB" smtClean="0"/>
-              <a:t>06/07/2020</a:t>
+              <a:t>22/07/2020</a:t>
             </a:fld>
             <a:endParaRPr lang="en-GB"/>
           </a:p>
@@ -2393,7 +2398,7 @@
           <a:p>
             <a:fld id="{EF4D51DD-81A9-48E9-84B4-E5461181C836}" type="datetimeFigureOut">
               <a:rPr lang="en-GB" smtClean="0"/>
-              <a:t>06/07/2020</a:t>
+              <a:t>22/07/2020</a:t>
             </a:fld>
             <a:endParaRPr lang="en-GB"/>
           </a:p>
@@ -2682,7 +2687,7 @@
           <a:p>
             <a:fld id="{EF4D51DD-81A9-48E9-84B4-E5461181C836}" type="datetimeFigureOut">
               <a:rPr lang="en-GB" smtClean="0"/>
-              <a:t>06/07/2020</a:t>
+              <a:t>22/07/2020</a:t>
             </a:fld>
             <a:endParaRPr lang="en-GB"/>
           </a:p>
@@ -2925,7 +2930,7 @@
           <a:p>
             <a:fld id="{EF4D51DD-81A9-48E9-84B4-E5461181C836}" type="datetimeFigureOut">
               <a:rPr lang="en-GB" smtClean="0"/>
-              <a:t>06/07/2020</a:t>
+              <a:t>22/07/2020</a:t>
             </a:fld>
             <a:endParaRPr lang="en-GB"/>
           </a:p>
@@ -3524,7 +3529,7 @@
         </p:nvSpPr>
         <p:spPr>
           <a:xfrm>
-            <a:off x="7246980" y="5380776"/>
+            <a:off x="7227786" y="5774180"/>
             <a:ext cx="1207703" cy="461665"/>
           </a:xfrm>
           <a:prstGeom prst="rect">
@@ -3565,7 +3570,7 @@
         </p:nvSpPr>
         <p:spPr>
           <a:xfrm>
-            <a:off x="5340720" y="5367199"/>
+            <a:off x="5340719" y="5742983"/>
             <a:ext cx="963725" cy="461665"/>
           </a:xfrm>
           <a:prstGeom prst="rect">
@@ -3607,7 +3612,7 @@
         </p:nvCxnSpPr>
         <p:spPr>
           <a:xfrm>
-            <a:off x="8595360" y="5611609"/>
+            <a:off x="8580020" y="6005013"/>
             <a:ext cx="661181" cy="0"/>
           </a:xfrm>
           <a:prstGeom prst="straightConnector1">
@@ -3691,8 +3696,8 @@
         </p:nvCxnSpPr>
         <p:spPr>
           <a:xfrm>
-            <a:off x="5862940" y="1242662"/>
-            <a:ext cx="0" cy="515799"/>
+            <a:off x="5845938" y="1152524"/>
+            <a:ext cx="0" cy="266412"/>
           </a:xfrm>
           <a:prstGeom prst="straightConnector1">
             <a:avLst/>
@@ -3737,7 +3742,7 @@
         </p:nvSpPr>
         <p:spPr>
           <a:xfrm>
-            <a:off x="4944533" y="1818528"/>
+            <a:off x="4944531" y="1418936"/>
             <a:ext cx="1802814" cy="461665"/>
           </a:xfrm>
           <a:prstGeom prst="rect">
@@ -3777,7 +3782,7 @@
         </p:nvSpPr>
         <p:spPr>
           <a:xfrm>
-            <a:off x="4925777" y="3024861"/>
+            <a:off x="4921174" y="2306165"/>
             <a:ext cx="1802814" cy="461665"/>
           </a:xfrm>
           <a:prstGeom prst="rect">
@@ -3819,7 +3824,7 @@
         </p:nvCxnSpPr>
         <p:spPr>
           <a:xfrm>
-            <a:off x="6416756" y="5611608"/>
+            <a:off x="6416755" y="5991997"/>
             <a:ext cx="661181" cy="0"/>
           </a:xfrm>
           <a:prstGeom prst="straightConnector1">
@@ -3859,7 +3864,7 @@
         </p:nvSpPr>
         <p:spPr>
           <a:xfrm>
-            <a:off x="4921175" y="4139880"/>
+            <a:off x="4921174" y="3113391"/>
             <a:ext cx="1802814" cy="461665"/>
           </a:xfrm>
           <a:prstGeom prst="rect">
@@ -3887,10 +3892,10 @@
       </p:sp>
       <p:cxnSp>
         <p:nvCxnSpPr>
-          <p:cNvPr id="29" name="Straight Arrow Connector 28">
-            <a:extLst>
-              <a:ext uri="{FF2B5EF4-FFF2-40B4-BE49-F238E27FC236}">
-                <a16:creationId xmlns:a16="http://schemas.microsoft.com/office/drawing/2014/main" id="{B2F637FF-8E69-4FAC-9A94-460C3CB0BE02}"/>
+          <p:cNvPr id="31" name="Straight Arrow Connector 30">
+            <a:extLst>
+              <a:ext uri="{FF2B5EF4-FFF2-40B4-BE49-F238E27FC236}">
+                <a16:creationId xmlns:a16="http://schemas.microsoft.com/office/drawing/2014/main" id="{E98DAFDE-FFDF-4ACA-A59A-116956035256}"/>
               </a:ext>
             </a:extLst>
           </p:cNvPr>
@@ -3901,8 +3906,8 @@
         </p:nvCxnSpPr>
         <p:spPr>
           <a:xfrm>
-            <a:off x="5845940" y="2379800"/>
-            <a:ext cx="0" cy="515799"/>
+            <a:off x="5845939" y="5305647"/>
+            <a:ext cx="0" cy="296641"/>
           </a:xfrm>
           <a:prstGeom prst="straightConnector1">
             <a:avLst/>
@@ -3933,12 +3938,51 @@
           </a:fontRef>
         </p:style>
       </p:cxnSp>
+      <p:sp>
+        <p:nvSpPr>
+          <p:cNvPr id="32" name="TextBox 31">
+            <a:extLst>
+              <a:ext uri="{FF2B5EF4-FFF2-40B4-BE49-F238E27FC236}">
+                <a16:creationId xmlns:a16="http://schemas.microsoft.com/office/drawing/2014/main" id="{63CEC488-11DA-4C31-9A6C-FC56D7D8219F}"/>
+              </a:ext>
+            </a:extLst>
+          </p:cNvPr>
+          <p:cNvSpPr txBox="1"/>
+          <p:nvPr/>
+        </p:nvSpPr>
+        <p:spPr>
+          <a:xfrm>
+            <a:off x="7353530" y="1054897"/>
+            <a:ext cx="1226490" cy="461665"/>
+          </a:xfrm>
+          <a:prstGeom prst="rect">
+            <a:avLst/>
+          </a:prstGeom>
+          <a:solidFill>
+            <a:schemeClr val="bg2">
+              <a:lumMod val="75000"/>
+            </a:schemeClr>
+          </a:solidFill>
+        </p:spPr>
+        <p:txBody>
+          <a:bodyPr wrap="none" rtlCol="0">
+            <a:spAutoFit/>
+          </a:bodyPr>
+          <a:lstStyle/>
+          <a:p>
+            <a:r>
+              <a:rPr lang="en-GB" sz="2400" dirty="0"/>
+              <a:t>Dropout</a:t>
+            </a:r>
+          </a:p>
+        </p:txBody>
+      </p:sp>
       <p:cxnSp>
         <p:nvCxnSpPr>
-          <p:cNvPr id="30" name="Straight Arrow Connector 29">
-            <a:extLst>
-              <a:ext uri="{FF2B5EF4-FFF2-40B4-BE49-F238E27FC236}">
-                <a16:creationId xmlns:a16="http://schemas.microsoft.com/office/drawing/2014/main" id="{23887863-DF56-4FB5-9A37-6BDC98885FA5}"/>
+          <p:cNvPr id="33" name="Straight Arrow Connector 32">
+            <a:extLst>
+              <a:ext uri="{FF2B5EF4-FFF2-40B4-BE49-F238E27FC236}">
+                <a16:creationId xmlns:a16="http://schemas.microsoft.com/office/drawing/2014/main" id="{6BC471E8-624B-4C3B-9D9F-F675C9ED97A5}"/>
               </a:ext>
             </a:extLst>
           </p:cNvPr>
@@ -3948,9 +3992,9 @@
           <p:nvPr/>
         </p:nvCxnSpPr>
         <p:spPr>
-          <a:xfrm>
-            <a:off x="5822582" y="3589866"/>
-            <a:ext cx="0" cy="515799"/>
+          <a:xfrm flipH="1" flipV="1">
+            <a:off x="6036146" y="1296096"/>
+            <a:ext cx="1191640" cy="4965"/>
           </a:xfrm>
           <a:prstGeom prst="straightConnector1">
             <a:avLst/>
@@ -3959,12 +4003,6 @@
             <a:headEnd type="none" w="med" len="med"/>
             <a:tailEnd type="triangle" w="lg" len="lg"/>
           </a:ln>
-          <a:scene3d>
-            <a:camera prst="orthographicFront">
-              <a:rot lat="0" lon="0" rev="0"/>
-            </a:camera>
-            <a:lightRig rig="threePt" dir="t"/>
-          </a:scene3d>
         </p:spPr>
         <p:style>
           <a:lnRef idx="1">
@@ -3981,60 +4019,12 @@
           </a:fontRef>
         </p:style>
       </p:cxnSp>
-      <p:cxnSp>
-        <p:nvCxnSpPr>
-          <p:cNvPr id="31" name="Straight Arrow Connector 30">
-            <a:extLst>
-              <a:ext uri="{FF2B5EF4-FFF2-40B4-BE49-F238E27FC236}">
-                <a16:creationId xmlns:a16="http://schemas.microsoft.com/office/drawing/2014/main" id="{E98DAFDE-FFDF-4ACA-A59A-116956035256}"/>
-              </a:ext>
-            </a:extLst>
-          </p:cNvPr>
-          <p:cNvCxnSpPr>
-            <a:cxnSpLocks/>
-          </p:cNvCxnSpPr>
-          <p:nvPr/>
-        </p:nvCxnSpPr>
-        <p:spPr>
-          <a:xfrm>
-            <a:off x="5822582" y="4744224"/>
-            <a:ext cx="0" cy="515799"/>
-          </a:xfrm>
-          <a:prstGeom prst="straightConnector1">
-            <a:avLst/>
-          </a:prstGeom>
-          <a:ln w="28575">
-            <a:headEnd type="none" w="med" len="med"/>
-            <a:tailEnd type="triangle" w="lg" len="lg"/>
-          </a:ln>
-          <a:scene3d>
-            <a:camera prst="orthographicFront">
-              <a:rot lat="0" lon="0" rev="0"/>
-            </a:camera>
-            <a:lightRig rig="threePt" dir="t"/>
-          </a:scene3d>
-        </p:spPr>
-        <p:style>
-          <a:lnRef idx="1">
-            <a:schemeClr val="dk1"/>
-          </a:lnRef>
-          <a:fillRef idx="0">
-            <a:schemeClr val="dk1"/>
-          </a:fillRef>
-          <a:effectRef idx="0">
-            <a:schemeClr val="dk1"/>
-          </a:effectRef>
-          <a:fontRef idx="minor">
-            <a:schemeClr val="tx1"/>
-          </a:fontRef>
-        </p:style>
-      </p:cxnSp>
-      <p:sp>
-        <p:nvSpPr>
-          <p:cNvPr id="32" name="TextBox 31">
-            <a:extLst>
-              <a:ext uri="{FF2B5EF4-FFF2-40B4-BE49-F238E27FC236}">
-                <a16:creationId xmlns:a16="http://schemas.microsoft.com/office/drawing/2014/main" id="{63CEC488-11DA-4C31-9A6C-FC56D7D8219F}"/>
+      <p:sp>
+        <p:nvSpPr>
+          <p:cNvPr id="35" name="TextBox 34">
+            <a:extLst>
+              <a:ext uri="{FF2B5EF4-FFF2-40B4-BE49-F238E27FC236}">
+                <a16:creationId xmlns:a16="http://schemas.microsoft.com/office/drawing/2014/main" id="{0328EB50-F380-4D31-A12F-1E5EF9707F80}"/>
               </a:ext>
             </a:extLst>
           </p:cNvPr>
@@ -4043,7 +4033,7 @@
         </p:nvSpPr>
         <p:spPr>
           <a:xfrm>
-            <a:off x="7368870" y="1269728"/>
+            <a:off x="7345513" y="1906345"/>
             <a:ext cx="1226490" cy="461665"/>
           </a:xfrm>
           <a:prstGeom prst="rect">
@@ -4068,54 +4058,12 @@
           </a:p>
         </p:txBody>
       </p:sp>
-      <p:cxnSp>
-        <p:nvCxnSpPr>
-          <p:cNvPr id="33" name="Straight Arrow Connector 32">
-            <a:extLst>
-              <a:ext uri="{FF2B5EF4-FFF2-40B4-BE49-F238E27FC236}">
-                <a16:creationId xmlns:a16="http://schemas.microsoft.com/office/drawing/2014/main" id="{6BC471E8-624B-4C3B-9D9F-F675C9ED97A5}"/>
-              </a:ext>
-            </a:extLst>
-          </p:cNvPr>
-          <p:cNvCxnSpPr>
-            <a:cxnSpLocks/>
-          </p:cNvCxnSpPr>
-          <p:nvPr/>
-        </p:nvCxnSpPr>
-        <p:spPr>
-          <a:xfrm flipH="1" flipV="1">
-            <a:off x="6037429" y="1509074"/>
-            <a:ext cx="1191640" cy="4965"/>
-          </a:xfrm>
-          <a:prstGeom prst="straightConnector1">
-            <a:avLst/>
-          </a:prstGeom>
-          <a:ln w="28575">
-            <a:headEnd type="none" w="med" len="med"/>
-            <a:tailEnd type="triangle" w="lg" len="lg"/>
-          </a:ln>
-        </p:spPr>
-        <p:style>
-          <a:lnRef idx="1">
-            <a:schemeClr val="dk1"/>
-          </a:lnRef>
-          <a:fillRef idx="0">
-            <a:schemeClr val="dk1"/>
-          </a:fillRef>
-          <a:effectRef idx="0">
-            <a:schemeClr val="dk1"/>
-          </a:effectRef>
-          <a:fontRef idx="minor">
-            <a:schemeClr val="tx1"/>
-          </a:fontRef>
-        </p:style>
-      </p:cxnSp>
-      <p:sp>
-        <p:nvSpPr>
-          <p:cNvPr id="35" name="TextBox 34">
-            <a:extLst>
-              <a:ext uri="{FF2B5EF4-FFF2-40B4-BE49-F238E27FC236}">
-                <a16:creationId xmlns:a16="http://schemas.microsoft.com/office/drawing/2014/main" id="{0328EB50-F380-4D31-A12F-1E5EF9707F80}"/>
+      <p:sp>
+        <p:nvSpPr>
+          <p:cNvPr id="36" name="TextBox 35">
+            <a:extLst>
+              <a:ext uri="{FF2B5EF4-FFF2-40B4-BE49-F238E27FC236}">
+                <a16:creationId xmlns:a16="http://schemas.microsoft.com/office/drawing/2014/main" id="{87531E02-A3BD-4A23-B19F-9196FCCD291D}"/>
               </a:ext>
             </a:extLst>
           </p:cNvPr>
@@ -4124,7 +4072,7 @@
         </p:nvSpPr>
         <p:spPr>
           <a:xfrm>
-            <a:off x="7353530" y="2433934"/>
+            <a:off x="7353530" y="2741297"/>
             <a:ext cx="1226490" cy="461665"/>
           </a:xfrm>
           <a:prstGeom prst="rect">
@@ -4149,45 +4097,6 @@
           </a:p>
         </p:txBody>
       </p:sp>
-      <p:sp>
-        <p:nvSpPr>
-          <p:cNvPr id="36" name="TextBox 35">
-            <a:extLst>
-              <a:ext uri="{FF2B5EF4-FFF2-40B4-BE49-F238E27FC236}">
-                <a16:creationId xmlns:a16="http://schemas.microsoft.com/office/drawing/2014/main" id="{87531E02-A3BD-4A23-B19F-9196FCCD291D}"/>
-              </a:ext>
-            </a:extLst>
-          </p:cNvPr>
-          <p:cNvSpPr txBox="1"/>
-          <p:nvPr/>
-        </p:nvSpPr>
-        <p:spPr>
-          <a:xfrm>
-            <a:off x="7368870" y="3598140"/>
-            <a:ext cx="1226490" cy="461665"/>
-          </a:xfrm>
-          <a:prstGeom prst="rect">
-            <a:avLst/>
-          </a:prstGeom>
-          <a:solidFill>
-            <a:schemeClr val="bg2">
-              <a:lumMod val="75000"/>
-            </a:schemeClr>
-          </a:solidFill>
-        </p:spPr>
-        <p:txBody>
-          <a:bodyPr wrap="none" rtlCol="0">
-            <a:spAutoFit/>
-          </a:bodyPr>
-          <a:lstStyle/>
-          <a:p>
-            <a:r>
-              <a:rPr lang="en-GB" sz="2400" dirty="0"/>
-              <a:t>Dropout</a:t>
-            </a:r>
-          </a:p>
-        </p:txBody>
-      </p:sp>
       <p:cxnSp>
         <p:nvCxnSpPr>
           <p:cNvPr id="37" name="Straight Arrow Connector 36">
@@ -4204,7 +4113,7 @@
         </p:nvCxnSpPr>
         <p:spPr>
           <a:xfrm flipH="1" flipV="1">
-            <a:off x="6036146" y="2718888"/>
+            <a:off x="5999906" y="2137178"/>
             <a:ext cx="1191640" cy="4965"/>
           </a:xfrm>
           <a:prstGeom prst="straightConnector1">
@@ -4246,7 +4155,7 @@
         </p:nvCxnSpPr>
         <p:spPr>
           <a:xfrm flipH="1" flipV="1">
-            <a:off x="5999906" y="3812038"/>
+            <a:off x="5999906" y="2972130"/>
             <a:ext cx="1191640" cy="4965"/>
           </a:xfrm>
           <a:prstGeom prst="straightConnector1">
@@ -4303,6 +4212,440 @@
             <a:r>
               <a:rPr lang="en-GB" sz="2400" dirty="0"/>
               <a:t>Images</a:t>
+            </a:r>
+          </a:p>
+        </p:txBody>
+      </p:sp>
+      <p:sp>
+        <p:nvSpPr>
+          <p:cNvPr id="34" name="TextBox 33">
+            <a:extLst>
+              <a:ext uri="{FF2B5EF4-FFF2-40B4-BE49-F238E27FC236}">
+                <a16:creationId xmlns:a16="http://schemas.microsoft.com/office/drawing/2014/main" id="{5331F272-125A-4FDC-A932-19617826FC09}"/>
+              </a:ext>
+            </a:extLst>
+          </p:cNvPr>
+          <p:cNvSpPr txBox="1"/>
+          <p:nvPr/>
+        </p:nvSpPr>
+        <p:spPr>
+          <a:xfrm>
+            <a:off x="4921174" y="3939094"/>
+            <a:ext cx="1802814" cy="461665"/>
+          </a:xfrm>
+          <a:prstGeom prst="rect">
+            <a:avLst/>
+          </a:prstGeom>
+          <a:solidFill>
+            <a:schemeClr val="accent1">
+              <a:lumMod val="60000"/>
+              <a:lumOff val="40000"/>
+            </a:schemeClr>
+          </a:solidFill>
+        </p:spPr>
+        <p:txBody>
+          <a:bodyPr wrap="square" rtlCol="0">
+            <a:spAutoFit/>
+          </a:bodyPr>
+          <a:lstStyle/>
+          <a:p>
+            <a:r>
+              <a:rPr lang="en-GB" sz="2400" dirty="0"/>
+              <a:t>Convolution</a:t>
+            </a:r>
+          </a:p>
+        </p:txBody>
+      </p:sp>
+      <p:sp>
+        <p:nvSpPr>
+          <p:cNvPr id="40" name="TextBox 39">
+            <a:extLst>
+              <a:ext uri="{FF2B5EF4-FFF2-40B4-BE49-F238E27FC236}">
+                <a16:creationId xmlns:a16="http://schemas.microsoft.com/office/drawing/2014/main" id="{4CB76DE7-6563-43CC-96E3-B7A7F1146C2C}"/>
+              </a:ext>
+            </a:extLst>
+          </p:cNvPr>
+          <p:cNvSpPr txBox="1"/>
+          <p:nvPr/>
+        </p:nvSpPr>
+        <p:spPr>
+          <a:xfrm>
+            <a:off x="4921174" y="4771224"/>
+            <a:ext cx="1802814" cy="461665"/>
+          </a:xfrm>
+          <a:prstGeom prst="rect">
+            <a:avLst/>
+          </a:prstGeom>
+          <a:solidFill>
+            <a:schemeClr val="accent1">
+              <a:lumMod val="60000"/>
+              <a:lumOff val="40000"/>
+            </a:schemeClr>
+          </a:solidFill>
+        </p:spPr>
+        <p:txBody>
+          <a:bodyPr wrap="square" rtlCol="0">
+            <a:spAutoFit/>
+          </a:bodyPr>
+          <a:lstStyle/>
+          <a:p>
+            <a:r>
+              <a:rPr lang="en-GB" sz="2400" dirty="0"/>
+              <a:t>Convolution</a:t>
+            </a:r>
+          </a:p>
+        </p:txBody>
+      </p:sp>
+      <p:cxnSp>
+        <p:nvCxnSpPr>
+          <p:cNvPr id="41" name="Straight Arrow Connector 40">
+            <a:extLst>
+              <a:ext uri="{FF2B5EF4-FFF2-40B4-BE49-F238E27FC236}">
+                <a16:creationId xmlns:a16="http://schemas.microsoft.com/office/drawing/2014/main" id="{DACA27F2-61EC-4D8C-8CD3-D9D0A0B940CB}"/>
+              </a:ext>
+            </a:extLst>
+          </p:cNvPr>
+          <p:cNvCxnSpPr>
+            <a:cxnSpLocks/>
+          </p:cNvCxnSpPr>
+          <p:nvPr/>
+        </p:nvCxnSpPr>
+        <p:spPr>
+          <a:xfrm>
+            <a:off x="5845938" y="1989666"/>
+            <a:ext cx="0" cy="266412"/>
+          </a:xfrm>
+          <a:prstGeom prst="straightConnector1">
+            <a:avLst/>
+          </a:prstGeom>
+          <a:ln w="28575">
+            <a:headEnd type="none" w="med" len="med"/>
+            <a:tailEnd type="triangle" w="lg" len="lg"/>
+          </a:ln>
+          <a:scene3d>
+            <a:camera prst="orthographicFront">
+              <a:rot lat="0" lon="0" rev="0"/>
+            </a:camera>
+            <a:lightRig rig="threePt" dir="t"/>
+          </a:scene3d>
+        </p:spPr>
+        <p:style>
+          <a:lnRef idx="1">
+            <a:schemeClr val="dk1"/>
+          </a:lnRef>
+          <a:fillRef idx="0">
+            <a:schemeClr val="dk1"/>
+          </a:fillRef>
+          <a:effectRef idx="0">
+            <a:schemeClr val="dk1"/>
+          </a:effectRef>
+          <a:fontRef idx="minor">
+            <a:schemeClr val="tx1"/>
+          </a:fontRef>
+        </p:style>
+      </p:cxnSp>
+      <p:cxnSp>
+        <p:nvCxnSpPr>
+          <p:cNvPr id="43" name="Straight Arrow Connector 42">
+            <a:extLst>
+              <a:ext uri="{FF2B5EF4-FFF2-40B4-BE49-F238E27FC236}">
+                <a16:creationId xmlns:a16="http://schemas.microsoft.com/office/drawing/2014/main" id="{2147CE2B-8FA8-418E-B46C-1839F37847BA}"/>
+              </a:ext>
+            </a:extLst>
+          </p:cNvPr>
+          <p:cNvCxnSpPr>
+            <a:cxnSpLocks/>
+          </p:cNvCxnSpPr>
+          <p:nvPr/>
+        </p:nvCxnSpPr>
+        <p:spPr>
+          <a:xfrm>
+            <a:off x="5817068" y="2846979"/>
+            <a:ext cx="0" cy="266412"/>
+          </a:xfrm>
+          <a:prstGeom prst="straightConnector1">
+            <a:avLst/>
+          </a:prstGeom>
+          <a:ln w="28575">
+            <a:headEnd type="none" w="med" len="med"/>
+            <a:tailEnd type="triangle" w="lg" len="lg"/>
+          </a:ln>
+          <a:scene3d>
+            <a:camera prst="orthographicFront">
+              <a:rot lat="0" lon="0" rev="0"/>
+            </a:camera>
+            <a:lightRig rig="threePt" dir="t"/>
+          </a:scene3d>
+        </p:spPr>
+        <p:style>
+          <a:lnRef idx="1">
+            <a:schemeClr val="dk1"/>
+          </a:lnRef>
+          <a:fillRef idx="0">
+            <a:schemeClr val="dk1"/>
+          </a:fillRef>
+          <a:effectRef idx="0">
+            <a:schemeClr val="dk1"/>
+          </a:effectRef>
+          <a:fontRef idx="minor">
+            <a:schemeClr val="tx1"/>
+          </a:fontRef>
+        </p:style>
+      </p:cxnSp>
+      <p:cxnSp>
+        <p:nvCxnSpPr>
+          <p:cNvPr id="44" name="Straight Arrow Connector 43">
+            <a:extLst>
+              <a:ext uri="{FF2B5EF4-FFF2-40B4-BE49-F238E27FC236}">
+                <a16:creationId xmlns:a16="http://schemas.microsoft.com/office/drawing/2014/main" id="{99894246-0E54-4F73-9834-4A7F15DC941A}"/>
+              </a:ext>
+            </a:extLst>
+          </p:cNvPr>
+          <p:cNvCxnSpPr>
+            <a:cxnSpLocks/>
+          </p:cNvCxnSpPr>
+          <p:nvPr/>
+        </p:nvCxnSpPr>
+        <p:spPr>
+          <a:xfrm>
+            <a:off x="5817068" y="3644000"/>
+            <a:ext cx="0" cy="266412"/>
+          </a:xfrm>
+          <a:prstGeom prst="straightConnector1">
+            <a:avLst/>
+          </a:prstGeom>
+          <a:ln w="28575">
+            <a:headEnd type="none" w="med" len="med"/>
+            <a:tailEnd type="triangle" w="lg" len="lg"/>
+          </a:ln>
+          <a:scene3d>
+            <a:camera prst="orthographicFront">
+              <a:rot lat="0" lon="0" rev="0"/>
+            </a:camera>
+            <a:lightRig rig="threePt" dir="t"/>
+          </a:scene3d>
+        </p:spPr>
+        <p:style>
+          <a:lnRef idx="1">
+            <a:schemeClr val="dk1"/>
+          </a:lnRef>
+          <a:fillRef idx="0">
+            <a:schemeClr val="dk1"/>
+          </a:fillRef>
+          <a:effectRef idx="0">
+            <a:schemeClr val="dk1"/>
+          </a:effectRef>
+          <a:fontRef idx="minor">
+            <a:schemeClr val="tx1"/>
+          </a:fontRef>
+        </p:style>
+      </p:cxnSp>
+      <p:cxnSp>
+        <p:nvCxnSpPr>
+          <p:cNvPr id="45" name="Straight Arrow Connector 44">
+            <a:extLst>
+              <a:ext uri="{FF2B5EF4-FFF2-40B4-BE49-F238E27FC236}">
+                <a16:creationId xmlns:a16="http://schemas.microsoft.com/office/drawing/2014/main" id="{45766084-5B31-4F58-92C4-4B5EDAA019C6}"/>
+              </a:ext>
+            </a:extLst>
+          </p:cNvPr>
+          <p:cNvCxnSpPr>
+            <a:cxnSpLocks/>
+          </p:cNvCxnSpPr>
+          <p:nvPr/>
+        </p:nvCxnSpPr>
+        <p:spPr>
+          <a:xfrm>
+            <a:off x="5817068" y="4504812"/>
+            <a:ext cx="0" cy="266412"/>
+          </a:xfrm>
+          <a:prstGeom prst="straightConnector1">
+            <a:avLst/>
+          </a:prstGeom>
+          <a:ln w="28575">
+            <a:headEnd type="none" w="med" len="med"/>
+            <a:tailEnd type="triangle" w="lg" len="lg"/>
+          </a:ln>
+          <a:scene3d>
+            <a:camera prst="orthographicFront">
+              <a:rot lat="0" lon="0" rev="0"/>
+            </a:camera>
+            <a:lightRig rig="threePt" dir="t"/>
+          </a:scene3d>
+        </p:spPr>
+        <p:style>
+          <a:lnRef idx="1">
+            <a:schemeClr val="dk1"/>
+          </a:lnRef>
+          <a:fillRef idx="0">
+            <a:schemeClr val="dk1"/>
+          </a:fillRef>
+          <a:effectRef idx="0">
+            <a:schemeClr val="dk1"/>
+          </a:effectRef>
+          <a:fontRef idx="minor">
+            <a:schemeClr val="tx1"/>
+          </a:fontRef>
+        </p:style>
+      </p:cxnSp>
+      <p:cxnSp>
+        <p:nvCxnSpPr>
+          <p:cNvPr id="46" name="Straight Arrow Connector 45">
+            <a:extLst>
+              <a:ext uri="{FF2B5EF4-FFF2-40B4-BE49-F238E27FC236}">
+                <a16:creationId xmlns:a16="http://schemas.microsoft.com/office/drawing/2014/main" id="{4136F458-D3CF-4043-B6AF-C312106E8F46}"/>
+              </a:ext>
+            </a:extLst>
+          </p:cNvPr>
+          <p:cNvCxnSpPr>
+            <a:cxnSpLocks/>
+          </p:cNvCxnSpPr>
+          <p:nvPr/>
+        </p:nvCxnSpPr>
+        <p:spPr>
+          <a:xfrm flipH="1" flipV="1">
+            <a:off x="6036146" y="3772873"/>
+            <a:ext cx="1191640" cy="4965"/>
+          </a:xfrm>
+          <a:prstGeom prst="straightConnector1">
+            <a:avLst/>
+          </a:prstGeom>
+          <a:ln w="28575">
+            <a:headEnd type="none" w="med" len="med"/>
+            <a:tailEnd type="triangle" w="lg" len="lg"/>
+          </a:ln>
+        </p:spPr>
+        <p:style>
+          <a:lnRef idx="1">
+            <a:schemeClr val="dk1"/>
+          </a:lnRef>
+          <a:fillRef idx="0">
+            <a:schemeClr val="dk1"/>
+          </a:fillRef>
+          <a:effectRef idx="0">
+            <a:schemeClr val="dk1"/>
+          </a:effectRef>
+          <a:fontRef idx="minor">
+            <a:schemeClr val="tx1"/>
+          </a:fontRef>
+        </p:style>
+      </p:cxnSp>
+      <p:cxnSp>
+        <p:nvCxnSpPr>
+          <p:cNvPr id="47" name="Straight Arrow Connector 46">
+            <a:extLst>
+              <a:ext uri="{FF2B5EF4-FFF2-40B4-BE49-F238E27FC236}">
+                <a16:creationId xmlns:a16="http://schemas.microsoft.com/office/drawing/2014/main" id="{B3FDF8E5-AF11-4173-8282-6239D70075B8}"/>
+              </a:ext>
+            </a:extLst>
+          </p:cNvPr>
+          <p:cNvCxnSpPr>
+            <a:cxnSpLocks/>
+          </p:cNvCxnSpPr>
+          <p:nvPr/>
+        </p:nvCxnSpPr>
+        <p:spPr>
+          <a:xfrm flipH="1" flipV="1">
+            <a:off x="5999906" y="4619308"/>
+            <a:ext cx="1191640" cy="4965"/>
+          </a:xfrm>
+          <a:prstGeom prst="straightConnector1">
+            <a:avLst/>
+          </a:prstGeom>
+          <a:ln w="28575">
+            <a:headEnd type="none" w="med" len="med"/>
+            <a:tailEnd type="triangle" w="lg" len="lg"/>
+          </a:ln>
+        </p:spPr>
+        <p:style>
+          <a:lnRef idx="1">
+            <a:schemeClr val="dk1"/>
+          </a:lnRef>
+          <a:fillRef idx="0">
+            <a:schemeClr val="dk1"/>
+          </a:fillRef>
+          <a:effectRef idx="0">
+            <a:schemeClr val="dk1"/>
+          </a:effectRef>
+          <a:fontRef idx="minor">
+            <a:schemeClr val="tx1"/>
+          </a:fontRef>
+        </p:style>
+      </p:cxnSp>
+      <p:sp>
+        <p:nvSpPr>
+          <p:cNvPr id="48" name="TextBox 47">
+            <a:extLst>
+              <a:ext uri="{FF2B5EF4-FFF2-40B4-BE49-F238E27FC236}">
+                <a16:creationId xmlns:a16="http://schemas.microsoft.com/office/drawing/2014/main" id="{9F6B1D68-A2EB-44AE-AC4A-D39DD4BA8AE5}"/>
+              </a:ext>
+            </a:extLst>
+          </p:cNvPr>
+          <p:cNvSpPr txBox="1"/>
+          <p:nvPr/>
+        </p:nvSpPr>
+        <p:spPr>
+          <a:xfrm>
+            <a:off x="7353530" y="3552824"/>
+            <a:ext cx="1226490" cy="461665"/>
+          </a:xfrm>
+          <a:prstGeom prst="rect">
+            <a:avLst/>
+          </a:prstGeom>
+          <a:solidFill>
+            <a:schemeClr val="bg2">
+              <a:lumMod val="75000"/>
+            </a:schemeClr>
+          </a:solidFill>
+        </p:spPr>
+        <p:txBody>
+          <a:bodyPr wrap="none" rtlCol="0">
+            <a:spAutoFit/>
+          </a:bodyPr>
+          <a:lstStyle/>
+          <a:p>
+            <a:r>
+              <a:rPr lang="en-GB" sz="2400" dirty="0"/>
+              <a:t>Dropout</a:t>
+            </a:r>
+          </a:p>
+        </p:txBody>
+      </p:sp>
+      <p:sp>
+        <p:nvSpPr>
+          <p:cNvPr id="49" name="TextBox 48">
+            <a:extLst>
+              <a:ext uri="{FF2B5EF4-FFF2-40B4-BE49-F238E27FC236}">
+                <a16:creationId xmlns:a16="http://schemas.microsoft.com/office/drawing/2014/main" id="{4AEE8649-DC3F-48D9-8F7C-A4D8B4AE4CD8}"/>
+              </a:ext>
+            </a:extLst>
+          </p:cNvPr>
+          <p:cNvSpPr txBox="1"/>
+          <p:nvPr/>
+        </p:nvSpPr>
+        <p:spPr>
+          <a:xfrm>
+            <a:off x="7353530" y="4364352"/>
+            <a:ext cx="1226490" cy="461665"/>
+          </a:xfrm>
+          <a:prstGeom prst="rect">
+            <a:avLst/>
+          </a:prstGeom>
+          <a:solidFill>
+            <a:schemeClr val="bg2">
+              <a:lumMod val="75000"/>
+            </a:schemeClr>
+          </a:solidFill>
+        </p:spPr>
+        <p:txBody>
+          <a:bodyPr wrap="none" rtlCol="0">
+            <a:spAutoFit/>
+          </a:bodyPr>
+          <a:lstStyle/>
+          <a:p>
+            <a:r>
+              <a:rPr lang="en-GB" sz="2400" dirty="0"/>
+              <a:t>Dropout</a:t>
             </a:r>
           </a:p>
         </p:txBody>

</xml_diff>